<commit_message>
Update presentation with proper slide titles and improved content extraction
Co-authored-by: Sabushaik <131872071+Sabushaik@users.noreply.github.com>
</commit_message>
<xml_diff>
--- a/Comprehensive_SOP_Presentation.pptx
+++ b/Comprehensive_SOP_Presentation.pptx
@@ -25552,7 +25552,7 @@
               </a:defRPr>
             </a:pPr>
             <a:r>
-              <a:t>To define a consistent, efficient, and employee-centric onboarding process that ensures smooth integration of new hires into Parabola 9 Private Limited, enabling them to become productive and aligned with company objectives from day one.</a:t>
+              <a:t>Employee Onboarding</a:t>
             </a:r>
           </a:p>
         </p:txBody>
@@ -25580,6 +25580,16 @@
             </a:pPr>
             <a:r>
               <a:t>1. Purpose</a:t>
+            </a:r>
+          </a:p>
+          <a:p>
+            <a:pPr>
+              <a:defRPr sz="1400">
+                <a:latin typeface="Aptos"/>
+              </a:defRPr>
+            </a:pPr>
+            <a:r>
+              <a:t>  • To define a consistent, efficient, and employee-centric onboarding process that ensures smooth in...</a:t>
             </a:r>
           </a:p>
           <a:p>
@@ -25662,16 +25672,6 @@
               <a:t>  • Ensure timely access to resources, systems, and documentation.</a:t>
             </a:r>
           </a:p>
-          <a:p>
-            <a:pPr>
-              <a:defRPr sz="1400">
-                <a:latin typeface="Aptos"/>
-              </a:defRPr>
-            </a:pPr>
-            <a:r>
-              <a:t>5. Pre-Onboarding</a:t>
-            </a:r>
-          </a:p>
         </p:txBody>
       </p:sp>
     </p:spTree>
@@ -25713,7 +25713,7 @@
               </a:defRPr>
             </a:pPr>
             <a:r>
-              <a:t>To define a consistent, efficient, and employee-centric onboarding process that ensures smooth integration of new hires into Parabola 9 Private Limited, enabling them to become productive and aligned with company objectives from day one. (Part 2)</a:t>
+              <a:t>Employee Onboarding (Part 2)</a:t>
             </a:r>
           </a:p>
         </p:txBody>
@@ -25874,7 +25874,7 @@
               </a:defRPr>
             </a:pPr>
             <a:r>
-              <a:t>To establish a structured, transparent, and compliant process for managing employee separation at Parabola 9 Private Limited, ensuring a smooth transition, protection of intellectual property, and timely settlement of dues.</a:t>
+              <a:t>Employee Relieving</a:t>
             </a:r>
           </a:p>
         </p:txBody>
@@ -25921,7 +25921,7 @@
               </a:defRPr>
             </a:pPr>
             <a:r>
-              <a:t>  • 2. Scope</a:t>
+              <a:t>  • To establish a structured, transparent, and compliant process for managing employee separation at...</a:t>
             </a:r>
           </a:p>
           <a:p>
@@ -25931,7 +25931,7 @@
               </a:defRPr>
             </a:pPr>
             <a:r>
-              <a:t>  • This SOP applies to all employees — permanent, probationary, contractual, and interns — working i...</a:t>
+              <a:t>  • 2. Scope</a:t>
             </a:r>
           </a:p>
           <a:p>
@@ -26035,7 +26035,7 @@
               </a:defRPr>
             </a:pPr>
             <a:r>
-              <a:t>To establish a structured, transparent, and compliant process for managing employee separation at Parabola 9 Private Limited, ensuring a smooth transition, protection of intellectual property, and timely settlement of dues. (Part 2)</a:t>
+              <a:t>Employee Relieving (Part 2)</a:t>
             </a:r>
           </a:p>
         </p:txBody>
@@ -26196,7 +26196,7 @@
               </a:defRPr>
             </a:pPr>
             <a:r>
-              <a:t>This Standard Operating Procedure (SOP) outlines the rules and procedures governing employee attendance, leave management, and holiday entitlement at Parabola9 Private Limited. It ensures fairness, consistency, and compliance with company and statutory standards.</a:t>
+              <a:t>Leave &amp; Attendance Policy</a:t>
             </a:r>
           </a:p>
         </p:txBody>
@@ -26243,7 +26243,7 @@
               </a:defRPr>
             </a:pPr>
             <a:r>
-              <a:t>  • 2. Scope</a:t>
+              <a:t>  • This Standard Operating Procedure (SOP) outlines the rules and procedures governing employee atte...</a:t>
             </a:r>
           </a:p>
           <a:p>
@@ -26253,7 +26253,7 @@
               </a:defRPr>
             </a:pPr>
             <a:r>
-              <a:t>  • This policy applies to all full-time, probationary, and contractual employees across all departme...</a:t>
+              <a:t>  • 2. Scope</a:t>
             </a:r>
           </a:p>
           <a:p>
@@ -26357,7 +26357,7 @@
               </a:defRPr>
             </a:pPr>
             <a:r>
-              <a:t>This Standard Operating Procedure (SOP) outlines the rules and procedures governing employee attendance, leave management, and holiday entitlement at Parabola9 Private Limited. It ensures fairness, consistency, and compliance with company and statutory standards. (Part 2)</a:t>
+              <a:t>Leave &amp; Attendance Policy (Part 2)</a:t>
             </a:r>
           </a:p>
         </p:txBody>
@@ -26518,7 +26518,7 @@
               </a:defRPr>
             </a:pPr>
             <a:r>
-              <a:t>To define a structured and transparent process for evaluating employee performance, identifying strengths and areas of improvement, and supporting continuous growth within Parabola 9 Private Limited. This process ensures fair assessment, rewards alignment, and data confidentiality through secure, level-based evaluation systems.</a:t>
+              <a:t>Performance Appraisal</a:t>
             </a:r>
           </a:p>
         </p:txBody>
@@ -26565,7 +26565,7 @@
               </a:defRPr>
             </a:pPr>
             <a:r>
-              <a:t>  • 2. Scope</a:t>
+              <a:t>  • To define a structured and transparent process for evaluating employee performance, identifying s...</a:t>
             </a:r>
           </a:p>
           <a:p>
@@ -26575,7 +26575,7 @@
               </a:defRPr>
             </a:pPr>
             <a:r>
-              <a:t>  • This SOP applies to all full-time and probationary employees of Parabola 9 Private Limited across...</a:t>
+              <a:t>  • 2. Scope</a:t>
             </a:r>
           </a:p>
           <a:p>
@@ -26659,7 +26659,7 @@
               </a:defRPr>
             </a:pPr>
             <a:r>
-              <a:t>To define a structured and transparent process for evaluating employee performance, identifying strengths and areas of improvement, and supporting continuous growth within Parabola 9 Private Limited. This process ensures fair assessment, rewards alignment, and data confidentiality through secure, level-based evaluation systems. (Part 2)</a:t>
+              <a:t>Performance Appraisal (Part 2)</a:t>
             </a:r>
           </a:p>
         </p:txBody>
@@ -26820,7 +26820,7 @@
               </a:defRPr>
             </a:pPr>
             <a:r>
-              <a:t>To define a transparent and systematic process for payroll, salary disbursement, benefits management, and statutory compliance at Parabola 9 Private Limited, ensuring accuracy, timeliness, and confidentiality across all payroll operations.</a:t>
+              <a:t>Payroll &amp; Benefits</a:t>
             </a:r>
           </a:p>
         </p:txBody>
@@ -27261,7 +27261,7 @@
               </a:defRPr>
             </a:pPr>
             <a:r>
-              <a:t>To define a standardized process for planning, executing, and evaluating employee training and development programs at Parabola 9 Private Limited that align with organizational goals, technological advancement, and ISO/ISMS compliance.</a:t>
+              <a:t>Training &amp; Development</a:t>
             </a:r>
           </a:p>
         </p:txBody>
@@ -27402,7 +27402,7 @@
               </a:defRPr>
             </a:pPr>
             <a:r>
-              <a:t>To establish a fair, consistent, and legally compliant procedure for managing disciplinary matters, grievances, absenteeism, and employee misconduct at Parabola 9 Private Limited, ensuring transparency, objectivity, and adherence to corporate ethics and Indian employment laws.</a:t>
+              <a:t>Disciplinary &amp; Grievance</a:t>
             </a:r>
           </a:p>
         </p:txBody>
@@ -27563,7 +27563,7 @@
               </a:defRPr>
             </a:pPr>
             <a:r>
-              <a:t>To establish a uniform and secure process for creating, reviewing, executing, and maintaining Non-Disclosure Agreements (NDAs), Service Agreements , MoU/As and other Legal Agreements entered by Parabola 9 Private Limited, ensuring confidentiality, legal compliance, and organizational protection.</a:t>
+              <a:t>NDA &amp; Legal Agreements</a:t>
             </a:r>
           </a:p>
         </p:txBody>
@@ -27724,7 +27724,7 @@
               </a:defRPr>
             </a:pPr>
             <a:r>
-              <a:t>To establish and maintain a clear organizational structure defining hierarchical levels, departmental functions, and reporting relationships at Parabola9 Private Limited, ensuring operational efficiency, accountability, and transparency across all business units.</a:t>
+              <a:t>Organization Structure</a:t>
             </a:r>
           </a:p>
         </p:txBody>

</xml_diff>